<commit_message>
Update Links on 449 Slides
</commit_message>
<xml_diff>
--- a/teaching/CS0449-2234/rec01.pptx
+++ b/teaching/CS0449-2234/rec01.pptx
@@ -198,7 +198,7 @@
           <a:p>
             <a:fld id="{2518A644-EF4B-4DFC-86A3-F37E532C85B5}" type="datetimeFigureOut">
               <a:rPr lang="en-US" smtClean="0"/>
-              <a:t>1/21/2023</a:t>
+              <a:t>1/23/23</a:t>
             </a:fld>
             <a:endParaRPr lang="en-US"/>
           </a:p>
@@ -705,7 +705,7 @@
           <a:p>
             <a:fld id="{AE8DEAFF-F6FE-4160-BD52-F935596BA33A}" type="datetime1">
               <a:rPr lang="en-US" smtClean="0"/>
-              <a:t>1/21/2023</a:t>
+              <a:t>1/23/23</a:t>
             </a:fld>
             <a:endParaRPr lang="en-US" dirty="0"/>
           </a:p>
@@ -1249,7 +1249,7 @@
           <a:p>
             <a:fld id="{4862143E-50DC-4DBB-A9AF-6D92245E0AE9}" type="datetime1">
               <a:rPr lang="en-US" smtClean="0"/>
-              <a:t>1/21/2023</a:t>
+              <a:t>1/23/23</a:t>
             </a:fld>
             <a:endParaRPr lang="en-US"/>
           </a:p>
@@ -1432,7 +1432,7 @@
           <a:p>
             <a:fld id="{1B131C9E-65BA-45DD-BDAD-20DF5FBA63A6}" type="datetime1">
               <a:rPr lang="en-US" smtClean="0"/>
-              <a:t>1/21/2023</a:t>
+              <a:t>1/23/23</a:t>
             </a:fld>
             <a:endParaRPr lang="en-US"/>
           </a:p>
@@ -1605,7 +1605,7 @@
           <a:p>
             <a:fld id="{58369C37-9A54-4268-839E-8BA271866E2C}" type="datetime1">
               <a:rPr lang="en-US" smtClean="0"/>
-              <a:t>1/21/2023</a:t>
+              <a:t>1/23/23</a:t>
             </a:fld>
             <a:endParaRPr lang="en-US"/>
           </a:p>
@@ -1852,7 +1852,7 @@
           <a:p>
             <a:fld id="{26B254BF-0BA0-496D-9270-38D7695D8D39}" type="datetime1">
               <a:rPr lang="en-US" smtClean="0"/>
-              <a:t>1/21/2023</a:t>
+              <a:t>1/23/23</a:t>
             </a:fld>
             <a:endParaRPr lang="en-US"/>
           </a:p>
@@ -2087,7 +2087,7 @@
           <a:p>
             <a:fld id="{FA90C4D9-856D-4F02-9C9A-6FDB7488682F}" type="datetime1">
               <a:rPr lang="en-US" smtClean="0"/>
-              <a:t>1/21/2023</a:t>
+              <a:t>1/23/23</a:t>
             </a:fld>
             <a:endParaRPr lang="en-US"/>
           </a:p>
@@ -2457,7 +2457,7 @@
           <a:p>
             <a:fld id="{6EB3E15C-CD76-4422-B506-E73EE1CC849D}" type="datetime1">
               <a:rPr lang="en-US" smtClean="0"/>
-              <a:t>1/21/2023</a:t>
+              <a:t>1/23/23</a:t>
             </a:fld>
             <a:endParaRPr lang="en-US"/>
           </a:p>
@@ -2578,7 +2578,7 @@
           <a:p>
             <a:fld id="{D7069F65-3470-466B-BEC7-52EC51CF03A6}" type="datetime1">
               <a:rPr lang="en-US" smtClean="0"/>
-              <a:t>1/21/2023</a:t>
+              <a:t>1/23/23</a:t>
             </a:fld>
             <a:endParaRPr lang="en-US"/>
           </a:p>
@@ -2676,7 +2676,7 @@
           <a:p>
             <a:fld id="{3438578E-CC73-43FF-92BF-A141AF32A78A}" type="datetime1">
               <a:rPr lang="en-US" smtClean="0"/>
-              <a:t>1/21/2023</a:t>
+              <a:t>1/23/23</a:t>
             </a:fld>
             <a:endParaRPr lang="en-US"/>
           </a:p>
@@ -2956,7 +2956,7 @@
           <a:p>
             <a:fld id="{40A051CB-411E-4FAF-9D0F-A1249DB306D2}" type="datetime1">
               <a:rPr lang="en-US" smtClean="0"/>
-              <a:t>1/21/2023</a:t>
+              <a:t>1/23/23</a:t>
             </a:fld>
             <a:endParaRPr lang="en-US"/>
           </a:p>
@@ -3216,7 +3216,7 @@
           <a:p>
             <a:fld id="{5A538C38-D380-4CBD-ACA0-1BE37BD071FC}" type="datetime1">
               <a:rPr lang="en-US" smtClean="0"/>
-              <a:t>1/21/2023</a:t>
+              <a:t>1/23/23</a:t>
             </a:fld>
             <a:endParaRPr lang="en-US"/>
           </a:p>
@@ -3434,7 +3434,7 @@
           <a:p>
             <a:fld id="{9D108250-4699-419C-BA31-54CDAB732F31}" type="datetime1">
               <a:rPr lang="en-US" smtClean="0"/>
-              <a:t>1/21/2023</a:t>
+              <a:t>1/23/23</a:t>
             </a:fld>
             <a:endParaRPr lang="en-US"/>
           </a:p>
@@ -4516,35 +4516,18 @@
           <a:p>
             <a:pPr lvl="1"/>
             <a:r>
-              <a:rPr lang="en-US" dirty="0">
+              <a:rPr lang="en-US" sz="1600" dirty="0">
                 <a:solidFill>
                   <a:schemeClr val="accent1"/>
                 </a:solidFill>
                 <a:latin typeface="Consolas" panose="020B0609020204030204" pitchFamily="49" charset="0"/>
                 <a:ea typeface="Open Sans SemiBold" panose="020B0706030804020204" pitchFamily="34" charset="0"/>
                 <a:cs typeface="Consolas" panose="020B0609020204030204" pitchFamily="49" charset="0"/>
-                <a:hlinkClick r:id="rId2">
-                  <a:extLst>
-                    <a:ext uri="{A12FA001-AC4F-418D-AE19-62706E023703}">
-                      <ahyp:hlinkClr xmlns:ahyp="http://schemas.microsoft.com/office/drawing/2018/hyperlinkcolor" val="tx"/>
-                    </a:ext>
-                  </a:extLst>
-                </a:hlinkClick>
+                <a:hlinkClick r:id="rId2"/>
               </a:rPr>
-              <a:t>https://sites.pitt.edu/~shk148/teaching/CS0449-2234/</a:t>
-            </a:r>
-            <a:r>
-              <a:rPr lang="en-US" dirty="0">
-                <a:solidFill>
-                  <a:schemeClr val="accent1"/>
-                </a:solidFill>
-                <a:latin typeface="Consolas" panose="020B0609020204030204" pitchFamily="49" charset="0"/>
-                <a:ea typeface="Open Sans SemiBold" panose="020B0706030804020204" pitchFamily="34" charset="0"/>
-                <a:cs typeface="Consolas" panose="020B0609020204030204" pitchFamily="49" charset="0"/>
-              </a:rPr>
-              <a:t> </a:t>
-            </a:r>
-            <a:endParaRPr lang="en-US" dirty="0">
+              <a:t>https://sites.pitt.edu/~shk148/teaching/CS0449-2234/#handouts</a:t>
+            </a:r>
+            <a:endParaRPr lang="en-US" sz="1600" dirty="0">
               <a:solidFill>
                 <a:schemeClr val="accent1"/>
               </a:solidFill>
@@ -4569,13 +4552,13 @@
           <p:nvPr>
             <p:extLst>
               <p:ext uri="{D42A27DB-BD31-4B8C-83A1-F6EECF244321}">
-                <p14:modId xmlns:p14="http://schemas.microsoft.com/office/powerpoint/2010/main" val="2413890591"/>
+                <p14:modId xmlns:p14="http://schemas.microsoft.com/office/powerpoint/2010/main" val="4016749868"/>
               </p:ext>
             </p:extLst>
           </p:nvPr>
         </p:nvGraphicFramePr>
         <p:xfrm>
-          <a:off x="532898" y="1699072"/>
+          <a:off x="532897" y="1603279"/>
           <a:ext cx="8078206" cy="3459855"/>
         </p:xfrm>
         <a:graphic>
@@ -5166,7 +5149,7 @@
           <a:p>
             <a:fld id="{B6FAA7CD-DABF-470E-A1D3-880A269608C9}" type="datetime1">
               <a:rPr lang="en-US" smtClean="0"/>
-              <a:t>1/21/2023</a:t>
+              <a:t>1/23/23</a:t>
             </a:fld>
             <a:endParaRPr lang="en-US" dirty="0"/>
           </a:p>

</xml_diff>